<commit_message>
untested rules for Snakemake.bySample
</commit_message>
<xml_diff>
--- a/Snakemake.bySample/schema.pptx
+++ b/Snakemake.bySample/schema.pptx
@@ -259,7 +259,7 @@
           <a:p>
             <a:fld id="{E1A2546D-C337-864E-97E4-436D2A8FC99A}" type="datetimeFigureOut">
               <a:rPr lang="en-US" smtClean="0"/>
-              <a:t>6/16/20</a:t>
+              <a:t>6/17/20</a:t>
             </a:fld>
             <a:endParaRPr lang="en-US"/>
           </a:p>
@@ -457,7 +457,7 @@
           <a:p>
             <a:fld id="{E1A2546D-C337-864E-97E4-436D2A8FC99A}" type="datetimeFigureOut">
               <a:rPr lang="en-US" smtClean="0"/>
-              <a:t>6/16/20</a:t>
+              <a:t>6/17/20</a:t>
             </a:fld>
             <a:endParaRPr lang="en-US"/>
           </a:p>
@@ -665,7 +665,7 @@
           <a:p>
             <a:fld id="{E1A2546D-C337-864E-97E4-436D2A8FC99A}" type="datetimeFigureOut">
               <a:rPr lang="en-US" smtClean="0"/>
-              <a:t>6/16/20</a:t>
+              <a:t>6/17/20</a:t>
             </a:fld>
             <a:endParaRPr lang="en-US"/>
           </a:p>
@@ -863,7 +863,7 @@
           <a:p>
             <a:fld id="{E1A2546D-C337-864E-97E4-436D2A8FC99A}" type="datetimeFigureOut">
               <a:rPr lang="en-US" smtClean="0"/>
-              <a:t>6/16/20</a:t>
+              <a:t>6/17/20</a:t>
             </a:fld>
             <a:endParaRPr lang="en-US"/>
           </a:p>
@@ -1138,7 +1138,7 @@
           <a:p>
             <a:fld id="{E1A2546D-C337-864E-97E4-436D2A8FC99A}" type="datetimeFigureOut">
               <a:rPr lang="en-US" smtClean="0"/>
-              <a:t>6/16/20</a:t>
+              <a:t>6/17/20</a:t>
             </a:fld>
             <a:endParaRPr lang="en-US"/>
           </a:p>
@@ -1403,7 +1403,7 @@
           <a:p>
             <a:fld id="{E1A2546D-C337-864E-97E4-436D2A8FC99A}" type="datetimeFigureOut">
               <a:rPr lang="en-US" smtClean="0"/>
-              <a:t>6/16/20</a:t>
+              <a:t>6/17/20</a:t>
             </a:fld>
             <a:endParaRPr lang="en-US"/>
           </a:p>
@@ -1815,7 +1815,7 @@
           <a:p>
             <a:fld id="{E1A2546D-C337-864E-97E4-436D2A8FC99A}" type="datetimeFigureOut">
               <a:rPr lang="en-US" smtClean="0"/>
-              <a:t>6/16/20</a:t>
+              <a:t>6/17/20</a:t>
             </a:fld>
             <a:endParaRPr lang="en-US"/>
           </a:p>
@@ -1956,7 +1956,7 @@
           <a:p>
             <a:fld id="{E1A2546D-C337-864E-97E4-436D2A8FC99A}" type="datetimeFigureOut">
               <a:rPr lang="en-US" smtClean="0"/>
-              <a:t>6/16/20</a:t>
+              <a:t>6/17/20</a:t>
             </a:fld>
             <a:endParaRPr lang="en-US"/>
           </a:p>
@@ -2069,7 +2069,7 @@
           <a:p>
             <a:fld id="{E1A2546D-C337-864E-97E4-436D2A8FC99A}" type="datetimeFigureOut">
               <a:rPr lang="en-US" smtClean="0"/>
-              <a:t>6/16/20</a:t>
+              <a:t>6/17/20</a:t>
             </a:fld>
             <a:endParaRPr lang="en-US"/>
           </a:p>
@@ -2380,7 +2380,7 @@
           <a:p>
             <a:fld id="{E1A2546D-C337-864E-97E4-436D2A8FC99A}" type="datetimeFigureOut">
               <a:rPr lang="en-US" smtClean="0"/>
-              <a:t>6/16/20</a:t>
+              <a:t>6/17/20</a:t>
             </a:fld>
             <a:endParaRPr lang="en-US"/>
           </a:p>
@@ -2668,7 +2668,7 @@
           <a:p>
             <a:fld id="{E1A2546D-C337-864E-97E4-436D2A8FC99A}" type="datetimeFigureOut">
               <a:rPr lang="en-US" smtClean="0"/>
-              <a:t>6/16/20</a:t>
+              <a:t>6/17/20</a:t>
             </a:fld>
             <a:endParaRPr lang="en-US"/>
           </a:p>
@@ -2909,7 +2909,7 @@
           <a:p>
             <a:fld id="{E1A2546D-C337-864E-97E4-436D2A8FC99A}" type="datetimeFigureOut">
               <a:rPr lang="en-US" smtClean="0"/>
-              <a:t>6/16/20</a:t>
+              <a:t>6/17/20</a:t>
             </a:fld>
             <a:endParaRPr lang="en-US"/>
           </a:p>
@@ -3494,13 +3494,21 @@
           <a:p>
             <a:pPr lvl="2"/>
             <a:r>
-              <a:rPr lang="en-US" sz="1600" dirty="0" err="1"/>
+              <a:rPr lang="en-US" sz="1400"/>
+              <a:t>QC</a:t>
+            </a:r>
+            <a:endParaRPr lang="en-US" sz="1400" dirty="0"/>
+          </a:p>
+          <a:p>
+            <a:pPr lvl="3"/>
+            <a:r>
+              <a:rPr lang="en-US" sz="1400" dirty="0" err="1"/>
               <a:t>BaseFreq</a:t>
             </a:r>
-            <a:endParaRPr lang="en-US" sz="1600" dirty="0"/>
-          </a:p>
-          <a:p>
-            <a:pPr lvl="3"/>
+            <a:endParaRPr lang="en-US" sz="1400" dirty="0"/>
+          </a:p>
+          <a:p>
+            <a:pPr lvl="4"/>
             <a:r>
               <a:rPr lang="en-US" sz="1400" dirty="0" err="1"/>
               <a:t>freq.R</a:t>
@@ -3519,7 +3527,7 @@
             </a:r>
           </a:p>
           <a:p>
-            <a:pPr lvl="3"/>
+            <a:pPr lvl="4"/>
             <a:r>
               <a:rPr lang="en-US" sz="1400" dirty="0" err="1"/>
               <a:t>freq.R</a:t>
@@ -3530,15 +3538,15 @@
             </a:r>
           </a:p>
           <a:p>
-            <a:pPr lvl="2"/>
-            <a:r>
-              <a:rPr lang="en-US" sz="1600" dirty="0" err="1"/>
+            <a:pPr lvl="3"/>
+            <a:r>
+              <a:rPr lang="en-US" sz="1400" dirty="0" err="1"/>
               <a:t>FragLen</a:t>
             </a:r>
-            <a:endParaRPr lang="en-US" sz="1600" dirty="0"/>
-          </a:p>
-          <a:p>
-            <a:pPr lvl="3"/>
+            <a:endParaRPr lang="en-US" sz="1400" dirty="0"/>
+          </a:p>
+          <a:p>
+            <a:pPr lvl="4"/>
             <a:r>
               <a:rPr lang="en-US" sz="1400" dirty="0"/>
               <a:t>dist.{</a:t>

</xml_diff>